<commit_message>
modified a few small things in the slides
</commit_message>
<xml_diff>
--- a/git_intro.pptx
+++ b/git_intro.pptx
@@ -4218,7 +4218,7 @@
           <a:p>
             <a:fld id="{2AC11405-77E7-4229-A2B7-CFBA51124680}" type="datetimeFigureOut">
               <a:rPr lang="en-US" smtClean="0"/>
-              <a:t>4/24/2019</a:t>
+              <a:t>4/25/2019</a:t>
             </a:fld>
             <a:endParaRPr lang="en-US"/>
           </a:p>
@@ -5777,7 +5777,7 @@
           <a:p>
             <a:fld id="{EC5B9977-2039-41F1-8E10-6390F75FBE43}" type="datetimeFigureOut">
               <a:rPr lang="en-US" smtClean="0"/>
-              <a:t>4/24/2019</a:t>
+              <a:t>4/25/2019</a:t>
             </a:fld>
             <a:endParaRPr lang="en-US"/>
           </a:p>
@@ -5975,7 +5975,7 @@
           <a:p>
             <a:fld id="{EC5B9977-2039-41F1-8E10-6390F75FBE43}" type="datetimeFigureOut">
               <a:rPr lang="en-US" smtClean="0"/>
-              <a:t>4/24/2019</a:t>
+              <a:t>4/25/2019</a:t>
             </a:fld>
             <a:endParaRPr lang="en-US"/>
           </a:p>
@@ -6183,7 +6183,7 @@
           <a:p>
             <a:fld id="{EC5B9977-2039-41F1-8E10-6390F75FBE43}" type="datetimeFigureOut">
               <a:rPr lang="en-US" smtClean="0"/>
-              <a:t>4/24/2019</a:t>
+              <a:t>4/25/2019</a:t>
             </a:fld>
             <a:endParaRPr lang="en-US"/>
           </a:p>
@@ -6381,7 +6381,7 @@
           <a:p>
             <a:fld id="{EC5B9977-2039-41F1-8E10-6390F75FBE43}" type="datetimeFigureOut">
               <a:rPr lang="en-US" smtClean="0"/>
-              <a:t>4/24/2019</a:t>
+              <a:t>4/25/2019</a:t>
             </a:fld>
             <a:endParaRPr lang="en-US"/>
           </a:p>
@@ -6656,7 +6656,7 @@
           <a:p>
             <a:fld id="{EC5B9977-2039-41F1-8E10-6390F75FBE43}" type="datetimeFigureOut">
               <a:rPr lang="en-US" smtClean="0"/>
-              <a:t>4/24/2019</a:t>
+              <a:t>4/25/2019</a:t>
             </a:fld>
             <a:endParaRPr lang="en-US"/>
           </a:p>
@@ -6921,7 +6921,7 @@
           <a:p>
             <a:fld id="{EC5B9977-2039-41F1-8E10-6390F75FBE43}" type="datetimeFigureOut">
               <a:rPr lang="en-US" smtClean="0"/>
-              <a:t>4/24/2019</a:t>
+              <a:t>4/25/2019</a:t>
             </a:fld>
             <a:endParaRPr lang="en-US"/>
           </a:p>
@@ -7333,7 +7333,7 @@
           <a:p>
             <a:fld id="{EC5B9977-2039-41F1-8E10-6390F75FBE43}" type="datetimeFigureOut">
               <a:rPr lang="en-US" smtClean="0"/>
-              <a:t>4/24/2019</a:t>
+              <a:t>4/25/2019</a:t>
             </a:fld>
             <a:endParaRPr lang="en-US"/>
           </a:p>
@@ -7474,7 +7474,7 @@
           <a:p>
             <a:fld id="{EC5B9977-2039-41F1-8E10-6390F75FBE43}" type="datetimeFigureOut">
               <a:rPr lang="en-US" smtClean="0"/>
-              <a:t>4/24/2019</a:t>
+              <a:t>4/25/2019</a:t>
             </a:fld>
             <a:endParaRPr lang="en-US"/>
           </a:p>
@@ -7587,7 +7587,7 @@
           <a:p>
             <a:fld id="{EC5B9977-2039-41F1-8E10-6390F75FBE43}" type="datetimeFigureOut">
               <a:rPr lang="en-US" smtClean="0"/>
-              <a:t>4/24/2019</a:t>
+              <a:t>4/25/2019</a:t>
             </a:fld>
             <a:endParaRPr lang="en-US"/>
           </a:p>
@@ -7898,7 +7898,7 @@
           <a:p>
             <a:fld id="{EC5B9977-2039-41F1-8E10-6390F75FBE43}" type="datetimeFigureOut">
               <a:rPr lang="en-US" smtClean="0"/>
-              <a:t>4/24/2019</a:t>
+              <a:t>4/25/2019</a:t>
             </a:fld>
             <a:endParaRPr lang="en-US"/>
           </a:p>
@@ -8186,7 +8186,7 @@
           <a:p>
             <a:fld id="{EC5B9977-2039-41F1-8E10-6390F75FBE43}" type="datetimeFigureOut">
               <a:rPr lang="en-US" smtClean="0"/>
-              <a:t>4/24/2019</a:t>
+              <a:t>4/25/2019</a:t>
             </a:fld>
             <a:endParaRPr lang="en-US"/>
           </a:p>
@@ -8427,7 +8427,7 @@
           <a:p>
             <a:fld id="{EC5B9977-2039-41F1-8E10-6390F75FBE43}" type="datetimeFigureOut">
               <a:rPr lang="en-US" smtClean="0"/>
-              <a:t>4/24/2019</a:t>
+              <a:t>4/25/2019</a:t>
             </a:fld>
             <a:endParaRPr lang="en-US"/>
           </a:p>
@@ -10200,6 +10200,50 @@
           </a:p>
         </p:txBody>
       </p:sp>
+      <p:sp>
+        <p:nvSpPr>
+          <p:cNvPr id="4" name="TextBox 3">
+            <a:extLst>
+              <a:ext uri="{FF2B5EF4-FFF2-40B4-BE49-F238E27FC236}">
+                <a16:creationId xmlns:a16="http://schemas.microsoft.com/office/drawing/2014/main" id="{55460888-6E94-486A-9369-950ADC6DD456}"/>
+              </a:ext>
+            </a:extLst>
+          </p:cNvPr>
+          <p:cNvSpPr txBox="1"/>
+          <p:nvPr/>
+        </p:nvSpPr>
+        <p:spPr>
+          <a:xfrm>
+            <a:off x="884189" y="6308209"/>
+            <a:ext cx="6085897" cy="369332"/>
+          </a:xfrm>
+          <a:prstGeom prst="rect">
+            <a:avLst/>
+          </a:prstGeom>
+          <a:noFill/>
+        </p:spPr>
+        <p:txBody>
+          <a:bodyPr wrap="none" rtlCol="0">
+            <a:spAutoFit/>
+          </a:bodyPr>
+          <a:lstStyle/>
+          <a:p>
+            <a:r>
+              <a:rPr lang="en-US" dirty="0">
+                <a:hlinkClick r:id="rId4"/>
+              </a:rPr>
+              <a:t>https://</a:t>
+            </a:r>
+            <a:r>
+              <a:rPr lang="en-US" dirty="0" smtClean="0">
+                <a:hlinkClick r:id="rId4"/>
+              </a:rPr>
+              <a:t>tdmdal.github.io/git-workshop/basic-git-workflow.html</a:t>
+            </a:r>
+            <a:endParaRPr lang="en-US" dirty="0"/>
+          </a:p>
+        </p:txBody>
+      </p:sp>
     </p:spTree>
     <p:extLst>
       <p:ext uri="{BB962C8B-B14F-4D97-AF65-F5344CB8AC3E}">
@@ -11696,14 +11740,47 @@
           <a:p>
             <a:r>
               <a:rPr lang="en-US" dirty="0"/>
-              <a:t>Undo working directory </a:t>
+              <a:t>Undo working </a:t>
+            </a:r>
+            <a:r>
+              <a:rPr lang="en-US"/>
+              <a:t>directory </a:t>
+            </a:r>
+            <a:r>
+              <a:rPr lang="en-US" smtClean="0"/>
+              <a:t>changes</a:t>
+            </a:r>
+            <a:endParaRPr lang="en-US" dirty="0"/>
+          </a:p>
+          <a:p>
+            <a:pPr marL="0" indent="0" algn="ctr">
+              <a:buNone/>
+            </a:pPr>
+            <a:r>
+              <a:rPr lang="en-US" dirty="0">
+                <a:latin typeface="Consolas" panose="020B0609020204030204" pitchFamily="49" charset="0"/>
+              </a:rPr>
+              <a:t>git checkout -- &lt;file&gt;</a:t>
+            </a:r>
+          </a:p>
+          <a:p>
+            <a:endParaRPr lang="en-US" dirty="0"/>
+          </a:p>
+          <a:p>
+            <a:r>
+              <a:rPr lang="en-US" dirty="0"/>
+              <a:t>Retrieve old version of a file (to staging index &amp; working </a:t>
+            </a:r>
+            <a:r>
+              <a:rPr lang="en-US" dirty="0" err="1"/>
+              <a:t>dir</a:t>
             </a:r>
             <a:r>
               <a:rPr lang="en-US" dirty="0" smtClean="0"/>
-              <a:t>changes (</a:t>
-            </a:r>
-            <a:r>
-              <a:rPr lang="en-US" dirty="0" smtClean="0">
+              <a:t>) (</a:t>
+            </a:r>
+            <a:r>
+              <a:rPr lang="en-US" dirty="0">
                 <a:solidFill>
                   <a:srgbClr val="FF0000"/>
                 </a:solidFill>
@@ -11715,34 +11792,6 @@
               <a:t>)</a:t>
             </a:r>
             <a:endParaRPr lang="en-US" dirty="0"/>
-          </a:p>
-          <a:p>
-            <a:pPr marL="0" indent="0" algn="ctr">
-              <a:buNone/>
-            </a:pPr>
-            <a:r>
-              <a:rPr lang="en-US" dirty="0">
-                <a:latin typeface="Consolas" panose="020B0609020204030204" pitchFamily="49" charset="0"/>
-              </a:rPr>
-              <a:t>git checkout -- &lt;file&gt;</a:t>
-            </a:r>
-          </a:p>
-          <a:p>
-            <a:endParaRPr lang="en-US" dirty="0"/>
-          </a:p>
-          <a:p>
-            <a:r>
-              <a:rPr lang="en-US" dirty="0"/>
-              <a:t>Retrieve old version of a file (to staging index &amp; working </a:t>
-            </a:r>
-            <a:r>
-              <a:rPr lang="en-US" dirty="0" err="1"/>
-              <a:t>dir</a:t>
-            </a:r>
-            <a:r>
-              <a:rPr lang="en-US" dirty="0"/>
-              <a:t>)</a:t>
-            </a:r>
           </a:p>
           <a:p>
             <a:pPr marL="0" indent="0" algn="ctr">
@@ -29661,8 +29710,13 @@
           <a:p>
             <a:r>
               <a:rPr lang="en-US" dirty="0"/>
-              <a:t>Other Benefit of Using Git &amp; GitHub</a:t>
-            </a:r>
+              <a:t>Other </a:t>
+            </a:r>
+            <a:r>
+              <a:rPr lang="en-US" dirty="0" smtClean="0"/>
+              <a:t>Benefits</a:t>
+            </a:r>
+            <a:endParaRPr lang="en-US" dirty="0"/>
           </a:p>
         </p:txBody>
       </p:sp>
@@ -30335,6 +30389,50 @@
             <a:pPr marL="0" indent="0">
               <a:buNone/>
             </a:pPr>
+            <a:endParaRPr lang="en-US" dirty="0"/>
+          </a:p>
+        </p:txBody>
+      </p:sp>
+      <p:sp>
+        <p:nvSpPr>
+          <p:cNvPr id="4" name="TextBox 3">
+            <a:extLst>
+              <a:ext uri="{FF2B5EF4-FFF2-40B4-BE49-F238E27FC236}">
+                <a16:creationId xmlns:a16="http://schemas.microsoft.com/office/drawing/2014/main" id="{55460888-6E94-486A-9369-950ADC6DD456}"/>
+              </a:ext>
+            </a:extLst>
+          </p:cNvPr>
+          <p:cNvSpPr txBox="1"/>
+          <p:nvPr/>
+        </p:nvSpPr>
+        <p:spPr>
+          <a:xfrm>
+            <a:off x="884189" y="6308209"/>
+            <a:ext cx="6085897" cy="369332"/>
+          </a:xfrm>
+          <a:prstGeom prst="rect">
+            <a:avLst/>
+          </a:prstGeom>
+          <a:noFill/>
+        </p:spPr>
+        <p:txBody>
+          <a:bodyPr wrap="none" rtlCol="0">
+            <a:spAutoFit/>
+          </a:bodyPr>
+          <a:lstStyle/>
+          <a:p>
+            <a:r>
+              <a:rPr lang="en-US" dirty="0">
+                <a:hlinkClick r:id="rId3"/>
+              </a:rPr>
+              <a:t>https://</a:t>
+            </a:r>
+            <a:r>
+              <a:rPr lang="en-US" dirty="0" smtClean="0">
+                <a:hlinkClick r:id="rId3"/>
+              </a:rPr>
+              <a:t>tdmdal.github.io/git-workshop/basic-git-workflow.html</a:t>
+            </a:r>
             <a:endParaRPr lang="en-US" dirty="0"/>
           </a:p>
         </p:txBody>

</xml_diff>